<commit_message>
feat(3_derivation): finish vector task code
</commit_message>
<xml_diff>
--- a/lessons/3_derivation/ppt/全连接层的前向和后向传播推导.pptx
+++ b/lessons/3_derivation/ppt/全连接层的前向和后向传播推导.pptx
@@ -5,17 +5,17 @@
     <p:sldMasterId id="2147483648" r:id="rId1"/>
   </p:sldMasterIdLst>
   <p:notesMasterIdLst>
-    <p:notesMasterId r:id="rId21"/>
+    <p:notesMasterId r:id="rId25"/>
   </p:notesMasterIdLst>
   <p:handoutMasterIdLst>
-    <p:handoutMasterId r:id="rId22"/>
+    <p:handoutMasterId r:id="rId26"/>
   </p:handoutMasterIdLst>
   <p:sldIdLst>
     <p:sldId id="307" r:id="rId2"/>
     <p:sldId id="308" r:id="rId3"/>
     <p:sldId id="284" r:id="rId4"/>
-    <p:sldId id="999" r:id="rId5"/>
-    <p:sldId id="1004" r:id="rId6"/>
+    <p:sldId id="1004" r:id="rId5"/>
+    <p:sldId id="999" r:id="rId6"/>
     <p:sldId id="1000" r:id="rId7"/>
     <p:sldId id="1006" r:id="rId8"/>
     <p:sldId id="524" r:id="rId9"/>
@@ -26,15 +26,19 @@
     <p:sldId id="1009" r:id="rId14"/>
     <p:sldId id="1011" r:id="rId15"/>
     <p:sldId id="1008" r:id="rId16"/>
-    <p:sldId id="996" r:id="rId17"/>
-    <p:sldId id="997" r:id="rId18"/>
-    <p:sldId id="998" r:id="rId19"/>
-    <p:sldId id="653" r:id="rId20"/>
+    <p:sldId id="537" r:id="rId17"/>
+    <p:sldId id="536" r:id="rId18"/>
+    <p:sldId id="1014" r:id="rId19"/>
+    <p:sldId id="1013" r:id="rId20"/>
+    <p:sldId id="996" r:id="rId21"/>
+    <p:sldId id="997" r:id="rId22"/>
+    <p:sldId id="998" r:id="rId23"/>
+    <p:sldId id="653" r:id="rId24"/>
   </p:sldIdLst>
   <p:sldSz cx="12192000" cy="6858000"/>
   <p:notesSz cx="6858000" cy="9144000"/>
   <p:custDataLst>
-    <p:tags r:id="rId23"/>
+    <p:tags r:id="rId27"/>
   </p:custDataLst>
   <p:defaultTextStyle>
     <a:defPPr>
@@ -6566,7 +6570,7 @@
             </a:pPr>
             <a:r>
               <a:rPr lang="zh-CN" altLang="en-US" dirty="0"/>
-              <a:t>如果再增加多个隐藏层，又该如何计算梯度求导？</a:t>
+              <a:t>什么情况下需要增加输入层的神经元个数？</a:t>
             </a:r>
             <a:endParaRPr lang="en-US" altLang="zh-CN" dirty="0"/>
           </a:p>
@@ -6577,8 +6581,65 @@
             </a:pPr>
             <a:r>
               <a:rPr lang="zh-CN" altLang="en-US" dirty="0"/>
-              <a:t>能否推出一个针对所有的隐藏层的通用的计算公式？</a:t>
-            </a:r>
+              <a:t>什么情况下需要增加隐藏层的神经元个数？</a:t>
+            </a:r>
+            <a:endParaRPr lang="en-US" altLang="zh-CN" dirty="0"/>
+          </a:p>
+          <a:p>
+            <a:pPr marL="285750" indent="-285750">
+              <a:buFont typeface="Arial" panose="020B0604020202020204" pitchFamily="34" charset="0"/>
+              <a:buChar char="•"/>
+            </a:pPr>
+            <a:r>
+              <a:rPr lang="zh-CN" altLang="en-US" dirty="0"/>
+              <a:t>什么情况下需要增加输出层的神经元个数？</a:t>
+            </a:r>
+            <a:endParaRPr lang="en-US" altLang="zh-CN" dirty="0"/>
+          </a:p>
+          <a:p>
+            <a:pPr marL="285750" indent="-285750">
+              <a:buFont typeface="Arial" panose="020B0604020202020204" pitchFamily="34" charset="0"/>
+              <a:buChar char="•"/>
+            </a:pPr>
+            <a:r>
+              <a:rPr lang="zh-CN" altLang="en-US" dirty="0"/>
+              <a:t>什么情况下需要增加更多的隐藏层？</a:t>
+            </a:r>
+            <a:endParaRPr lang="en-US" altLang="zh-CN" dirty="0"/>
+          </a:p>
+          <a:p>
+            <a:pPr marL="285750" indent="-285750">
+              <a:buFont typeface="Arial" panose="020B0604020202020204" pitchFamily="34" charset="0"/>
+              <a:buChar char="•"/>
+            </a:pPr>
+            <a:endParaRPr lang="en-US" altLang="zh-CN" dirty="0"/>
+          </a:p>
+          <a:p>
+            <a:pPr marL="285750" indent="-285750">
+              <a:buFont typeface="Arial" panose="020B0604020202020204" pitchFamily="34" charset="0"/>
+              <a:buChar char="•"/>
+            </a:pPr>
+            <a:endParaRPr lang="en-US" altLang="zh-CN" dirty="0"/>
+          </a:p>
+          <a:p>
+            <a:pPr marL="285750" indent="-285750">
+              <a:buFont typeface="Arial" panose="020B0604020202020204" pitchFamily="34" charset="0"/>
+              <a:buChar char="•"/>
+            </a:pPr>
+            <a:endParaRPr lang="en-US" altLang="zh-CN" dirty="0"/>
+          </a:p>
+          <a:p>
+            <a:pPr marL="285750" indent="-285750">
+              <a:buFont typeface="Arial" panose="020B0604020202020204" pitchFamily="34" charset="0"/>
+              <a:buChar char="•"/>
+            </a:pPr>
+            <a:endParaRPr lang="en-US" altLang="zh-CN" dirty="0"/>
+          </a:p>
+          <a:p>
+            <a:pPr marL="285750" indent="-285750">
+              <a:buFont typeface="Arial" panose="020B0604020202020204" pitchFamily="34" charset="0"/>
+              <a:buChar char="•"/>
+            </a:pPr>
             <a:endParaRPr lang="en-US" altLang="zh-CN" dirty="0"/>
           </a:p>
           <a:p>
@@ -6862,8 +6923,8 @@
         </p:nvSpPr>
         <p:spPr>
           <a:xfrm>
-            <a:off x="1457012" y="2647806"/>
-            <a:ext cx="3215471" cy="646331"/>
+            <a:off x="1272783" y="2257867"/>
+            <a:ext cx="4002601" cy="923330"/>
           </a:xfrm>
           <a:prstGeom prst="rect">
             <a:avLst/>
@@ -6878,14 +6939,14 @@
           <a:p>
             <a:r>
               <a:rPr kumimoji="1" lang="zh-CN" altLang="en-US" dirty="0"/>
-              <a:t>输入层、输出层各只有一层；</a:t>
+              <a:t>输入层、输出层各只有一层，隐藏层可以有任意多层；</a:t>
             </a:r>
             <a:endParaRPr kumimoji="1" lang="en-US" altLang="zh-CN" dirty="0"/>
           </a:p>
           <a:p>
             <a:r>
               <a:rPr kumimoji="1" lang="zh-CN" altLang="en-US" dirty="0"/>
-              <a:t>隐藏层可以有任意多层</a:t>
+              <a:t>每层有任意多的神经元</a:t>
             </a:r>
             <a:endParaRPr lang="en-US" altLang="zh-CN" dirty="0"/>
           </a:p>
@@ -7716,7 +7777,7 @@
               <a:buChar char="•"/>
             </a:pPr>
             <a:r>
-              <a:rPr lang="en-US" altLang="zh-CN">
+              <a:rPr lang="en-US" altLang="zh-CN" dirty="0">
                 <a:sym typeface="+mn-ea"/>
               </a:rPr>
               <a:t>TODO</a:t>
@@ -7829,12 +7890,12 @@
       </p:grpSpPr>
       <p:sp>
         <p:nvSpPr>
-          <p:cNvPr id="2" name="文本占位符 1"/>
+          <p:cNvPr id="2" name="标题 1"/>
           <p:cNvSpPr>
             <a:spLocks noGrp="1"/>
           </p:cNvSpPr>
           <p:nvPr>
-            <p:ph type="body" idx="1"/>
+            <p:ph type="title"/>
           </p:nvPr>
         </p:nvSpPr>
         <p:spPr/>
@@ -7842,33 +7903,9 @@
           <a:bodyPr/>
           <a:lstStyle/>
           <a:p>
-            <a:pPr>
-              <a:buFont typeface="Arial" panose="020B0604020202020204" pitchFamily="34" charset="0"/>
-            </a:pPr>
-            <a:endParaRPr dirty="0">
-              <a:sym typeface="+mn-ea"/>
-            </a:endParaRPr>
-          </a:p>
-        </p:txBody>
-      </p:sp>
-      <p:sp>
-        <p:nvSpPr>
-          <p:cNvPr id="3" name="标题 2"/>
-          <p:cNvSpPr>
-            <a:spLocks noGrp="1"/>
-          </p:cNvSpPr>
-          <p:nvPr>
-            <p:ph type="title"/>
-          </p:nvPr>
-        </p:nvSpPr>
-        <p:spPr/>
-        <p:txBody>
-          <a:bodyPr/>
-          <a:lstStyle/>
-          <a:p>
             <a:r>
               <a:rPr lang="zh-CN" altLang="en-US"/>
-              <a:t>下节课预告</a:t>
+              <a:t>总结</a:t>
             </a:r>
           </a:p>
         </p:txBody>
@@ -7885,6 +7922,528 @@
 </file>
 
 <file path=ppt/slides/slide17.xml><?xml version="1.0" encoding="utf-8"?>
+<p:sld xmlns:a="http://schemas.openxmlformats.org/drawingml/2006/main" xmlns:r="http://schemas.openxmlformats.org/officeDocument/2006/relationships" xmlns:p="http://schemas.openxmlformats.org/presentationml/2006/main">
+  <p:cSld>
+    <p:spTree>
+      <p:nvGrpSpPr>
+        <p:cNvPr id="1" name=""/>
+        <p:cNvGrpSpPr/>
+        <p:nvPr/>
+      </p:nvGrpSpPr>
+      <p:grpSpPr>
+        <a:xfrm>
+          <a:off x="0" y="0"/>
+          <a:ext cx="0" cy="0"/>
+          <a:chOff x="0" y="0"/>
+          <a:chExt cx="0" cy="0"/>
+        </a:xfrm>
+      </p:grpSpPr>
+      <p:sp>
+        <p:nvSpPr>
+          <p:cNvPr id="2" name="文本占位符 1"/>
+          <p:cNvSpPr>
+            <a:spLocks noGrp="1"/>
+          </p:cNvSpPr>
+          <p:nvPr>
+            <p:ph type="body" idx="1"/>
+          </p:nvPr>
+        </p:nvSpPr>
+        <p:spPr/>
+        <p:txBody>
+          <a:bodyPr/>
+          <a:lstStyle/>
+          <a:p>
+            <a:pPr marL="285750" indent="-285750">
+              <a:buFont typeface="Arial" panose="020B0604020202020204" pitchFamily="34" charset="0"/>
+              <a:buChar char="•"/>
+            </a:pPr>
+            <a:r>
+              <a:rPr lang="en-US" dirty="0" err="1"/>
+              <a:t>请回答所有主问题</a:t>
+            </a:r>
+            <a:r>
+              <a:rPr lang="zh-CN" altLang="en-US" dirty="0"/>
+              <a:t>？</a:t>
+            </a:r>
+            <a:endParaRPr dirty="0">
+              <a:sym typeface="+mn-ea"/>
+            </a:endParaRPr>
+          </a:p>
+          <a:p>
+            <a:endParaRPr dirty="0">
+              <a:solidFill>
+                <a:schemeClr val="bg2"/>
+              </a:solidFill>
+              <a:sym typeface="+mn-ea"/>
+            </a:endParaRPr>
+          </a:p>
+          <a:p>
+            <a:pPr marL="285750" indent="-285750">
+              <a:buFont typeface="Arial" panose="020B0604020202020204" pitchFamily="34" charset="0"/>
+              <a:buChar char="•"/>
+            </a:pPr>
+            <a:r>
+              <a:rPr lang="zh-CN" altLang="en-US" dirty="0"/>
+              <a:t>自学、展学</a:t>
+            </a:r>
+            <a:endParaRPr lang="en-US" altLang="zh-CN" dirty="0"/>
+          </a:p>
+          <a:p>
+            <a:pPr marL="285750" indent="-285750">
+              <a:buFont typeface="Arial" panose="020B0604020202020204" pitchFamily="34" charset="0"/>
+              <a:buChar char="•"/>
+            </a:pPr>
+            <a:endParaRPr dirty="0">
+              <a:sym typeface="+mn-ea"/>
+            </a:endParaRPr>
+          </a:p>
+        </p:txBody>
+      </p:sp>
+      <p:sp>
+        <p:nvSpPr>
+          <p:cNvPr id="3" name="标题 2"/>
+          <p:cNvSpPr>
+            <a:spLocks noGrp="1"/>
+          </p:cNvSpPr>
+          <p:nvPr>
+            <p:ph type="title"/>
+          </p:nvPr>
+        </p:nvSpPr>
+        <p:spPr/>
+        <p:txBody>
+          <a:bodyPr/>
+          <a:lstStyle/>
+          <a:p>
+            <a:r>
+              <a:rPr lang="zh-CN" altLang="en-US"/>
+              <a:t>总结</a:t>
+            </a:r>
+          </a:p>
+        </p:txBody>
+      </p:sp>
+      <p:graphicFrame>
+        <p:nvGraphicFramePr>
+          <p:cNvPr id="4" name="对象 3">
+            <a:hlinkClick r:id="" action="ppaction://ole?verb=0"/>
+          </p:cNvPr>
+          <p:cNvGraphicFramePr>
+            <a:graphicFrameLocks noChangeAspect="1"/>
+          </p:cNvGraphicFramePr>
+          <p:nvPr/>
+        </p:nvGraphicFramePr>
+        <p:xfrm>
+          <a:off x="5638800" y="3244850"/>
+          <a:ext cx="914400" cy="368300"/>
+        </p:xfrm>
+        <a:graphic>
+          <a:graphicData uri="http://schemas.openxmlformats.org/presentationml/2006/ole">
+            <mc:AlternateContent xmlns:mc="http://schemas.openxmlformats.org/markup-compatibility/2006">
+              <mc:Choice xmlns:v="urn:schemas-microsoft-com:vml" Requires="v">
+                <p:oleObj r:id="rId3" imgW="914400" imgH="368300" progId="Equation.KSEE3">
+                  <p:embed/>
+                </p:oleObj>
+              </mc:Choice>
+              <mc:Fallback>
+                <p:oleObj r:id="rId3" imgW="914400" imgH="368300" progId="Equation.KSEE3">
+                  <p:embed/>
+                  <p:pic>
+                    <p:nvPicPr>
+                      <p:cNvPr id="4" name="对象 3">
+                        <a:hlinkClick r:id="" action="ppaction://ole?verb=0"/>
+                      </p:cNvPr>
+                      <p:cNvPicPr/>
+                      <p:nvPr/>
+                    </p:nvPicPr>
+                    <p:blipFill>
+                      <a:blip r:embed="rId4"/>
+                      <a:stretch>
+                        <a:fillRect/>
+                      </a:stretch>
+                    </p:blipFill>
+                    <p:spPr>
+                      <a:xfrm>
+                        <a:off x="5638800" y="3244850"/>
+                        <a:ext cx="914400" cy="368300"/>
+                      </a:xfrm>
+                      <a:prstGeom prst="rect">
+                        <a:avLst/>
+                      </a:prstGeom>
+                    </p:spPr>
+                  </p:pic>
+                </p:oleObj>
+              </mc:Fallback>
+            </mc:AlternateContent>
+          </a:graphicData>
+        </a:graphic>
+      </p:graphicFrame>
+    </p:spTree>
+    <p:custDataLst>
+      <p:tags r:id="rId1"/>
+    </p:custDataLst>
+  </p:cSld>
+  <p:clrMapOvr>
+    <a:masterClrMapping/>
+  </p:clrMapOvr>
+</p:sld>
+</file>
+
+<file path=ppt/slides/slide18.xml><?xml version="1.0" encoding="utf-8"?>
+<p:sld xmlns:a="http://schemas.openxmlformats.org/drawingml/2006/main" xmlns:r="http://schemas.openxmlformats.org/officeDocument/2006/relationships" xmlns:p="http://schemas.openxmlformats.org/presentationml/2006/main">
+  <p:cSld>
+    <p:spTree>
+      <p:nvGrpSpPr>
+        <p:cNvPr id="1" name=""/>
+        <p:cNvGrpSpPr/>
+        <p:nvPr/>
+      </p:nvGrpSpPr>
+      <p:grpSpPr>
+        <a:xfrm>
+          <a:off x="0" y="0"/>
+          <a:ext cx="0" cy="0"/>
+          <a:chOff x="0" y="0"/>
+          <a:chExt cx="0" cy="0"/>
+        </a:xfrm>
+      </p:grpSpPr>
+      <p:sp>
+        <p:nvSpPr>
+          <p:cNvPr id="2" name="文本占位符 1"/>
+          <p:cNvSpPr>
+            <a:spLocks noGrp="1"/>
+          </p:cNvSpPr>
+          <p:nvPr>
+            <p:ph type="body" idx="1"/>
+          </p:nvPr>
+        </p:nvSpPr>
+        <p:spPr/>
+        <p:txBody>
+          <a:bodyPr/>
+          <a:lstStyle/>
+          <a:p>
+            <a:pPr marL="285750" indent="-285750">
+              <a:buFont typeface="Arial" panose="020B0604020202020204" pitchFamily="34" charset="0"/>
+              <a:buChar char="•"/>
+            </a:pPr>
+            <a:endParaRPr dirty="0">
+              <a:sym typeface="+mn-ea"/>
+            </a:endParaRPr>
+          </a:p>
+        </p:txBody>
+      </p:sp>
+      <p:sp>
+        <p:nvSpPr>
+          <p:cNvPr id="3" name="标题 2"/>
+          <p:cNvSpPr>
+            <a:spLocks noGrp="1"/>
+          </p:cNvSpPr>
+          <p:nvPr>
+            <p:ph type="title"/>
+          </p:nvPr>
+        </p:nvSpPr>
+        <p:spPr/>
+        <p:txBody>
+          <a:bodyPr/>
+          <a:lstStyle/>
+          <a:p>
+            <a:r>
+              <a:rPr lang="zh-CN" altLang="en-US" dirty="0"/>
+              <a:t>参考资料</a:t>
+            </a:r>
+          </a:p>
+        </p:txBody>
+      </p:sp>
+      <p:graphicFrame>
+        <p:nvGraphicFramePr>
+          <p:cNvPr id="4" name="对象 3">
+            <a:hlinkClick r:id="" action="ppaction://ole?verb=0"/>
+          </p:cNvPr>
+          <p:cNvGraphicFramePr>
+            <a:graphicFrameLocks noChangeAspect="1"/>
+          </p:cNvGraphicFramePr>
+          <p:nvPr/>
+        </p:nvGraphicFramePr>
+        <p:xfrm>
+          <a:off x="5638800" y="3244850"/>
+          <a:ext cx="914400" cy="368300"/>
+        </p:xfrm>
+        <a:graphic>
+          <a:graphicData uri="http://schemas.openxmlformats.org/presentationml/2006/ole">
+            <mc:AlternateContent xmlns:mc="http://schemas.openxmlformats.org/markup-compatibility/2006">
+              <mc:Choice xmlns:v="urn:schemas-microsoft-com:vml" Requires="v">
+                <p:oleObj r:id="rId3" imgW="914400" imgH="368300" progId="Equation.KSEE3">
+                  <p:embed/>
+                </p:oleObj>
+              </mc:Choice>
+              <mc:Fallback>
+                <p:oleObj r:id="rId3" imgW="914400" imgH="368300" progId="Equation.KSEE3">
+                  <p:embed/>
+                  <p:pic>
+                    <p:nvPicPr>
+                      <p:cNvPr id="4" name="对象 3">
+                        <a:hlinkClick r:id="" action="ppaction://ole?verb=0"/>
+                      </p:cNvPr>
+                      <p:cNvPicPr/>
+                      <p:nvPr/>
+                    </p:nvPicPr>
+                    <p:blipFill>
+                      <a:blip r:embed="rId4"/>
+                      <a:stretch>
+                        <a:fillRect/>
+                      </a:stretch>
+                    </p:blipFill>
+                    <p:spPr>
+                      <a:xfrm>
+                        <a:off x="5638800" y="3244850"/>
+                        <a:ext cx="914400" cy="368300"/>
+                      </a:xfrm>
+                      <a:prstGeom prst="rect">
+                        <a:avLst/>
+                      </a:prstGeom>
+                    </p:spPr>
+                  </p:pic>
+                </p:oleObj>
+              </mc:Fallback>
+            </mc:AlternateContent>
+          </a:graphicData>
+        </a:graphic>
+      </p:graphicFrame>
+    </p:spTree>
+    <p:custDataLst>
+      <p:tags r:id="rId1"/>
+    </p:custDataLst>
+    <p:extLst>
+      <p:ext uri="{BB962C8B-B14F-4D97-AF65-F5344CB8AC3E}">
+        <p14:creationId xmlns:p14="http://schemas.microsoft.com/office/powerpoint/2010/main" val="2517994622"/>
+      </p:ext>
+    </p:extLst>
+  </p:cSld>
+  <p:clrMapOvr>
+    <a:masterClrMapping/>
+  </p:clrMapOvr>
+</p:sld>
+</file>
+
+<file path=ppt/slides/slide19.xml><?xml version="1.0" encoding="utf-8"?>
+<p:sld xmlns:a="http://schemas.openxmlformats.org/drawingml/2006/main" xmlns:r="http://schemas.openxmlformats.org/officeDocument/2006/relationships" xmlns:p="http://schemas.openxmlformats.org/presentationml/2006/main">
+  <p:cSld>
+    <p:spTree>
+      <p:nvGrpSpPr>
+        <p:cNvPr id="1" name=""/>
+        <p:cNvGrpSpPr/>
+        <p:nvPr/>
+      </p:nvGrpSpPr>
+      <p:grpSpPr>
+        <a:xfrm>
+          <a:off x="0" y="0"/>
+          <a:ext cx="0" cy="0"/>
+          <a:chOff x="0" y="0"/>
+          <a:chExt cx="0" cy="0"/>
+        </a:xfrm>
+      </p:grpSpPr>
+      <p:sp>
+        <p:nvSpPr>
+          <p:cNvPr id="2" name="文本占位符 1"/>
+          <p:cNvSpPr>
+            <a:spLocks noGrp="1"/>
+          </p:cNvSpPr>
+          <p:nvPr>
+            <p:ph type="body" idx="1"/>
+          </p:nvPr>
+        </p:nvSpPr>
+        <p:spPr/>
+        <p:txBody>
+          <a:bodyPr/>
+          <a:lstStyle/>
+          <a:p>
+            <a:pPr>
+              <a:buFont typeface="Arial" panose="020B0604020202020204" pitchFamily="34" charset="0"/>
+            </a:pPr>
+            <a:r>
+              <a:rPr lang="en-US" dirty="0">
+                <a:sym typeface="+mn-ea"/>
+              </a:rPr>
+              <a:t>TODO</a:t>
+            </a:r>
+            <a:endParaRPr dirty="0">
+              <a:sym typeface="+mn-ea"/>
+            </a:endParaRPr>
+          </a:p>
+        </p:txBody>
+      </p:sp>
+      <p:sp>
+        <p:nvSpPr>
+          <p:cNvPr id="3" name="标题 2"/>
+          <p:cNvSpPr>
+            <a:spLocks noGrp="1"/>
+          </p:cNvSpPr>
+          <p:nvPr>
+            <p:ph type="title"/>
+          </p:nvPr>
+        </p:nvSpPr>
+        <p:spPr/>
+        <p:txBody>
+          <a:bodyPr/>
+          <a:lstStyle/>
+          <a:p>
+            <a:r>
+              <a:rPr lang="zh-CN" altLang="en-US"/>
+              <a:t>下节课预告</a:t>
+            </a:r>
+          </a:p>
+        </p:txBody>
+      </p:sp>
+    </p:spTree>
+    <p:custDataLst>
+      <p:tags r:id="rId1"/>
+    </p:custDataLst>
+    <p:extLst>
+      <p:ext uri="{BB962C8B-B14F-4D97-AF65-F5344CB8AC3E}">
+        <p14:creationId xmlns:p14="http://schemas.microsoft.com/office/powerpoint/2010/main" val="1027050507"/>
+      </p:ext>
+    </p:extLst>
+  </p:cSld>
+  <p:clrMapOvr>
+    <a:masterClrMapping/>
+  </p:clrMapOvr>
+</p:sld>
+</file>
+
+<file path=ppt/slides/slide2.xml><?xml version="1.0" encoding="utf-8"?>
+<p:sld xmlns:a="http://schemas.openxmlformats.org/drawingml/2006/main" xmlns:r="http://schemas.openxmlformats.org/officeDocument/2006/relationships" xmlns:p="http://schemas.openxmlformats.org/presentationml/2006/main">
+  <p:cSld>
+    <p:spTree>
+      <p:nvGrpSpPr>
+        <p:cNvPr id="1" name=""/>
+        <p:cNvGrpSpPr/>
+        <p:nvPr/>
+      </p:nvGrpSpPr>
+      <p:grpSpPr>
+        <a:xfrm>
+          <a:off x="0" y="0"/>
+          <a:ext cx="0" cy="0"/>
+          <a:chOff x="0" y="0"/>
+          <a:chExt cx="0" cy="0"/>
+        </a:xfrm>
+      </p:grpSpPr>
+      <p:sp>
+        <p:nvSpPr>
+          <p:cNvPr id="2" name="标题 1"/>
+          <p:cNvSpPr>
+            <a:spLocks noGrp="1"/>
+          </p:cNvSpPr>
+          <p:nvPr>
+            <p:ph type="title"/>
+          </p:nvPr>
+        </p:nvSpPr>
+        <p:spPr>
+          <a:xfrm>
+            <a:off x="669882" y="2108221"/>
+            <a:ext cx="10852237" cy="899167"/>
+          </a:xfrm>
+        </p:spPr>
+        <p:txBody>
+          <a:bodyPr/>
+          <a:lstStyle/>
+          <a:p>
+            <a:r>
+              <a:rPr lang="zh-CN" altLang="en-US" dirty="0"/>
+              <a:t>第三节课：</a:t>
+            </a:r>
+            <a:br>
+              <a:rPr lang="en-US" altLang="zh-CN" dirty="0"/>
+            </a:br>
+            <a:r>
+              <a:rPr lang="zh-CN" altLang="en-US" dirty="0"/>
+              <a:t>全连接层的前向和后向传播推导（上）</a:t>
+            </a:r>
+          </a:p>
+        </p:txBody>
+      </p:sp>
+    </p:spTree>
+    <p:custDataLst>
+      <p:tags r:id="rId1"/>
+    </p:custDataLst>
+  </p:cSld>
+  <p:clrMapOvr>
+    <a:masterClrMapping/>
+  </p:clrMapOvr>
+</p:sld>
+</file>
+
+<file path=ppt/slides/slide20.xml><?xml version="1.0" encoding="utf-8"?>
+<p:sld xmlns:a="http://schemas.openxmlformats.org/drawingml/2006/main" xmlns:r="http://schemas.openxmlformats.org/officeDocument/2006/relationships" xmlns:p="http://schemas.openxmlformats.org/presentationml/2006/main">
+  <p:cSld>
+    <p:spTree>
+      <p:nvGrpSpPr>
+        <p:cNvPr id="1" name=""/>
+        <p:cNvGrpSpPr/>
+        <p:nvPr/>
+      </p:nvGrpSpPr>
+      <p:grpSpPr>
+        <a:xfrm>
+          <a:off x="0" y="0"/>
+          <a:ext cx="0" cy="0"/>
+          <a:chOff x="0" y="0"/>
+          <a:chExt cx="0" cy="0"/>
+        </a:xfrm>
+      </p:grpSpPr>
+      <p:sp>
+        <p:nvSpPr>
+          <p:cNvPr id="2" name="文本占位符 1"/>
+          <p:cNvSpPr>
+            <a:spLocks noGrp="1"/>
+          </p:cNvSpPr>
+          <p:nvPr>
+            <p:ph type="body" idx="1"/>
+          </p:nvPr>
+        </p:nvSpPr>
+        <p:spPr/>
+        <p:txBody>
+          <a:bodyPr/>
+          <a:lstStyle/>
+          <a:p>
+            <a:pPr>
+              <a:buFont typeface="Arial" panose="020B0604020202020204" pitchFamily="34" charset="0"/>
+            </a:pPr>
+            <a:endParaRPr dirty="0">
+              <a:sym typeface="+mn-ea"/>
+            </a:endParaRPr>
+          </a:p>
+        </p:txBody>
+      </p:sp>
+      <p:sp>
+        <p:nvSpPr>
+          <p:cNvPr id="3" name="标题 2"/>
+          <p:cNvSpPr>
+            <a:spLocks noGrp="1"/>
+          </p:cNvSpPr>
+          <p:nvPr>
+            <p:ph type="title"/>
+          </p:nvPr>
+        </p:nvSpPr>
+        <p:spPr/>
+        <p:txBody>
+          <a:bodyPr/>
+          <a:lstStyle/>
+          <a:p>
+            <a:r>
+              <a:rPr lang="zh-CN" altLang="en-US"/>
+              <a:t>下节课预告</a:t>
+            </a:r>
+          </a:p>
+        </p:txBody>
+      </p:sp>
+    </p:spTree>
+    <p:custDataLst>
+      <p:tags r:id="rId1"/>
+    </p:custDataLst>
+  </p:cSld>
+  <p:clrMapOvr>
+    <a:masterClrMapping/>
+  </p:clrMapOvr>
+</p:sld>
+</file>
+
+<file path=ppt/slides/slide21.xml><?xml version="1.0" encoding="utf-8"?>
 <p:sld xmlns:a="http://schemas.openxmlformats.org/drawingml/2006/main" xmlns:r="http://schemas.openxmlformats.org/officeDocument/2006/relationships" xmlns:p="http://schemas.openxmlformats.org/presentationml/2006/main">
   <p:cSld>
     <p:spTree>
@@ -7912,7 +8471,7 @@
 </p:sld>
 </file>
 
-<file path=ppt/slides/slide18.xml><?xml version="1.0" encoding="utf-8"?>
+<file path=ppt/slides/slide22.xml><?xml version="1.0" encoding="utf-8"?>
 <p:sld xmlns:a="http://schemas.openxmlformats.org/drawingml/2006/main" xmlns:r="http://schemas.openxmlformats.org/officeDocument/2006/relationships" xmlns:p="http://schemas.openxmlformats.org/presentationml/2006/main">
   <p:cSld>
     <p:spTree>
@@ -7985,7 +8544,7 @@
 </p:sld>
 </file>
 
-<file path=ppt/slides/slide19.xml><?xml version="1.0" encoding="utf-8"?>
+<file path=ppt/slides/slide23.xml><?xml version="1.0" encoding="utf-8"?>
 <p:sld xmlns:a="http://schemas.openxmlformats.org/drawingml/2006/main" xmlns:r="http://schemas.openxmlformats.org/officeDocument/2006/relationships" xmlns:p="http://schemas.openxmlformats.org/presentationml/2006/main">
   <p:cSld>
     <p:spTree>
@@ -8002,68 +8561,6 @@
           <a:chExt cx="0" cy="0"/>
         </a:xfrm>
       </p:grpSpPr>
-    </p:spTree>
-    <p:custDataLst>
-      <p:tags r:id="rId1"/>
-    </p:custDataLst>
-  </p:cSld>
-  <p:clrMapOvr>
-    <a:masterClrMapping/>
-  </p:clrMapOvr>
-</p:sld>
-</file>
-
-<file path=ppt/slides/slide2.xml><?xml version="1.0" encoding="utf-8"?>
-<p:sld xmlns:a="http://schemas.openxmlformats.org/drawingml/2006/main" xmlns:r="http://schemas.openxmlformats.org/officeDocument/2006/relationships" xmlns:p="http://schemas.openxmlformats.org/presentationml/2006/main">
-  <p:cSld>
-    <p:spTree>
-      <p:nvGrpSpPr>
-        <p:cNvPr id="1" name=""/>
-        <p:cNvGrpSpPr/>
-        <p:nvPr/>
-      </p:nvGrpSpPr>
-      <p:grpSpPr>
-        <a:xfrm>
-          <a:off x="0" y="0"/>
-          <a:ext cx="0" cy="0"/>
-          <a:chOff x="0" y="0"/>
-          <a:chExt cx="0" cy="0"/>
-        </a:xfrm>
-      </p:grpSpPr>
-      <p:sp>
-        <p:nvSpPr>
-          <p:cNvPr id="2" name="标题 1"/>
-          <p:cNvSpPr>
-            <a:spLocks noGrp="1"/>
-          </p:cNvSpPr>
-          <p:nvPr>
-            <p:ph type="title"/>
-          </p:nvPr>
-        </p:nvSpPr>
-        <p:spPr>
-          <a:xfrm>
-            <a:off x="669882" y="2108221"/>
-            <a:ext cx="10852237" cy="899167"/>
-          </a:xfrm>
-        </p:spPr>
-        <p:txBody>
-          <a:bodyPr/>
-          <a:lstStyle/>
-          <a:p>
-            <a:r>
-              <a:rPr lang="zh-CN" altLang="en-US" dirty="0"/>
-              <a:t>第三节课：</a:t>
-            </a:r>
-            <a:br>
-              <a:rPr lang="en-US" altLang="zh-CN" dirty="0"/>
-            </a:br>
-            <a:r>
-              <a:rPr lang="zh-CN" altLang="en-US" dirty="0"/>
-              <a:t>全连接层的前向和后向传播推导（上）</a:t>
-            </a:r>
-          </a:p>
-        </p:txBody>
-      </p:sp>
     </p:spTree>
     <p:custDataLst>
       <p:tags r:id="rId1"/>
@@ -8290,116 +8787,6 @@
 </file>
 
 <file path=ppt/slides/slide4.xml><?xml version="1.0" encoding="utf-8"?>
-<p:sld xmlns:a="http://schemas.openxmlformats.org/drawingml/2006/main" xmlns:r="http://schemas.openxmlformats.org/officeDocument/2006/relationships" xmlns:p="http://schemas.openxmlformats.org/presentationml/2006/main">
-  <p:cSld>
-    <p:spTree>
-      <p:nvGrpSpPr>
-        <p:cNvPr id="1" name=""/>
-        <p:cNvGrpSpPr/>
-        <p:nvPr/>
-      </p:nvGrpSpPr>
-      <p:grpSpPr>
-        <a:xfrm>
-          <a:off x="0" y="0"/>
-          <a:ext cx="0" cy="0"/>
-          <a:chOff x="0" y="0"/>
-          <a:chExt cx="0" cy="0"/>
-        </a:xfrm>
-      </p:grpSpPr>
-      <p:sp>
-        <p:nvSpPr>
-          <p:cNvPr id="2" name="文本占位符 1"/>
-          <p:cNvSpPr>
-            <a:spLocks noGrp="1"/>
-          </p:cNvSpPr>
-          <p:nvPr>
-            <p:ph type="body" idx="1"/>
-          </p:nvPr>
-        </p:nvSpPr>
-        <p:spPr/>
-        <p:txBody>
-          <a:bodyPr/>
-          <a:lstStyle/>
-          <a:p>
-            <a:pPr marL="285750" indent="-285750">
-              <a:buFont typeface="Arial" panose="020B0604020202020204" pitchFamily="34" charset="0"/>
-              <a:buChar char="•"/>
-            </a:pPr>
-            <a:r>
-              <a:rPr lang="zh-CN" altLang="en-US" dirty="0"/>
-              <a:t>如果再增加多个隐藏层，又该如何计算梯度求导？</a:t>
-            </a:r>
-            <a:endParaRPr lang="en-US" altLang="zh-CN" dirty="0"/>
-          </a:p>
-          <a:p>
-            <a:pPr marL="285750" indent="-285750">
-              <a:buFont typeface="Arial" panose="020B0604020202020204" pitchFamily="34" charset="0"/>
-              <a:buChar char="•"/>
-            </a:pPr>
-            <a:r>
-              <a:rPr lang="zh-CN" altLang="en-US" dirty="0"/>
-              <a:t>权重、偏移的数量太多，导致前向传播和梯度求导的计算很臃肿，如何优化？</a:t>
-            </a:r>
-            <a:endParaRPr lang="en-US" altLang="zh-CN" dirty="0"/>
-          </a:p>
-          <a:p>
-            <a:pPr marL="285750" indent="-285750">
-              <a:buFont typeface="Arial" panose="020B0604020202020204" pitchFamily="34" charset="0"/>
-              <a:buChar char="•"/>
-            </a:pPr>
-            <a:r>
-              <a:rPr lang="zh-CN" altLang="en-US" dirty="0"/>
-              <a:t>能否推出一个针对所有的隐藏层的通用的计算公式？</a:t>
-            </a:r>
-            <a:endParaRPr lang="en-US" altLang="zh-CN" dirty="0"/>
-          </a:p>
-          <a:p>
-            <a:endParaRPr lang="en-US" altLang="zh-CN" dirty="0"/>
-          </a:p>
-        </p:txBody>
-      </p:sp>
-      <p:sp>
-        <p:nvSpPr>
-          <p:cNvPr id="3" name="标题 2"/>
-          <p:cNvSpPr>
-            <a:spLocks noGrp="1"/>
-          </p:cNvSpPr>
-          <p:nvPr>
-            <p:ph type="title"/>
-          </p:nvPr>
-        </p:nvSpPr>
-        <p:spPr/>
-        <p:txBody>
-          <a:bodyPr/>
-          <a:lstStyle/>
-          <a:p>
-            <a:r>
-              <a:rPr lang="zh-CN" altLang="en-US" dirty="0"/>
-              <a:t>为什么要学习本课？</a:t>
-            </a:r>
-            <a:endParaRPr dirty="0">
-              <a:sym typeface="+mn-ea"/>
-            </a:endParaRPr>
-          </a:p>
-        </p:txBody>
-      </p:sp>
-    </p:spTree>
-    <p:custDataLst>
-      <p:tags r:id="rId1"/>
-    </p:custDataLst>
-    <p:extLst>
-      <p:ext uri="{BB962C8B-B14F-4D97-AF65-F5344CB8AC3E}">
-        <p14:creationId xmlns:p14="http://schemas.microsoft.com/office/powerpoint/2010/main" val="2657445567"/>
-      </p:ext>
-    </p:extLst>
-  </p:cSld>
-  <p:clrMapOvr>
-    <a:masterClrMapping/>
-  </p:clrMapOvr>
-</p:sld>
-</file>
-
-<file path=ppt/slides/slide5.xml><?xml version="1.0" encoding="utf-8"?>
 <p:sld xmlns:a="http://schemas.openxmlformats.org/drawingml/2006/main" xmlns:r="http://schemas.openxmlformats.org/officeDocument/2006/relationships" xmlns:p="http://schemas.openxmlformats.org/presentationml/2006/main">
   <p:cSld>
     <p:spTree>
@@ -8897,6 +9284,102 @@
 </p:sld>
 </file>
 
+<file path=ppt/slides/slide5.xml><?xml version="1.0" encoding="utf-8"?>
+<p:sld xmlns:a="http://schemas.openxmlformats.org/drawingml/2006/main" xmlns:r="http://schemas.openxmlformats.org/officeDocument/2006/relationships" xmlns:p="http://schemas.openxmlformats.org/presentationml/2006/main">
+  <p:cSld>
+    <p:spTree>
+      <p:nvGrpSpPr>
+        <p:cNvPr id="1" name=""/>
+        <p:cNvGrpSpPr/>
+        <p:nvPr/>
+      </p:nvGrpSpPr>
+      <p:grpSpPr>
+        <a:xfrm>
+          <a:off x="0" y="0"/>
+          <a:ext cx="0" cy="0"/>
+          <a:chOff x="0" y="0"/>
+          <a:chExt cx="0" cy="0"/>
+        </a:xfrm>
+      </p:grpSpPr>
+      <p:sp>
+        <p:nvSpPr>
+          <p:cNvPr id="2" name="文本占位符 1"/>
+          <p:cNvSpPr>
+            <a:spLocks noGrp="1"/>
+          </p:cNvSpPr>
+          <p:nvPr>
+            <p:ph type="body" idx="1"/>
+          </p:nvPr>
+        </p:nvSpPr>
+        <p:spPr/>
+        <p:txBody>
+          <a:bodyPr/>
+          <a:lstStyle/>
+          <a:p>
+            <a:pPr marL="285750" indent="-285750">
+              <a:buFont typeface="Arial" panose="020B0604020202020204" pitchFamily="34" charset="0"/>
+              <a:buChar char="•"/>
+            </a:pPr>
+            <a:r>
+              <a:rPr lang="zh-CN" altLang="en-US" dirty="0"/>
+              <a:t>权重、偏移的数量太多，导致前向传播和梯度求导的计算很臃肿，如何优化？</a:t>
+            </a:r>
+            <a:endParaRPr lang="en-US" altLang="zh-CN" dirty="0"/>
+          </a:p>
+          <a:p>
+            <a:pPr marL="285750" indent="-285750">
+              <a:buFont typeface="Arial" panose="020B0604020202020204" pitchFamily="34" charset="0"/>
+              <a:buChar char="•"/>
+            </a:pPr>
+            <a:r>
+              <a:rPr lang="zh-CN" altLang="en-US" dirty="0"/>
+              <a:t>如果增加隐藏层中的神经元数量，如何才能不影响前向传播的计算公式？</a:t>
+            </a:r>
+            <a:endParaRPr lang="en-US" altLang="zh-CN" dirty="0"/>
+          </a:p>
+        </p:txBody>
+      </p:sp>
+      <p:sp>
+        <p:nvSpPr>
+          <p:cNvPr id="3" name="标题 2"/>
+          <p:cNvSpPr>
+            <a:spLocks noGrp="1"/>
+          </p:cNvSpPr>
+          <p:nvPr>
+            <p:ph type="title"/>
+          </p:nvPr>
+        </p:nvSpPr>
+        <p:spPr/>
+        <p:txBody>
+          <a:bodyPr/>
+          <a:lstStyle/>
+          <a:p>
+            <a:r>
+              <a:rPr lang="zh-CN" altLang="en-US" dirty="0"/>
+              <a:t>为什么要学习本课？</a:t>
+            </a:r>
+            <a:endParaRPr dirty="0">
+              <a:sym typeface="+mn-ea"/>
+            </a:endParaRPr>
+          </a:p>
+        </p:txBody>
+      </p:sp>
+    </p:spTree>
+    <p:custDataLst>
+      <p:tags r:id="rId1"/>
+    </p:custDataLst>
+    <p:extLst>
+      <p:ext uri="{BB962C8B-B14F-4D97-AF65-F5344CB8AC3E}">
+        <p14:creationId xmlns:p14="http://schemas.microsoft.com/office/powerpoint/2010/main" val="2657445567"/>
+      </p:ext>
+    </p:extLst>
+  </p:cSld>
+  <p:clrMapOvr>
+    <a:masterClrMapping/>
+  </p:clrMapOvr>
+</p:sld>
+</file>
+
 <file path=ppt/slides/slide6.xml><?xml version="1.0" encoding="utf-8"?>
 <p:sld xmlns:a="http://schemas.openxmlformats.org/drawingml/2006/main" xmlns:r="http://schemas.openxmlformats.org/officeDocument/2006/relationships" xmlns:p="http://schemas.openxmlformats.org/presentationml/2006/main">
   <p:cSld>
@@ -9449,10 +9932,10 @@
       </p:pic>
       <p:pic>
         <p:nvPicPr>
-          <p:cNvPr id="9" name="图片 8">
+          <p:cNvPr id="13" name="图片 12">
             <a:extLst>
               <a:ext uri="{FF2B5EF4-FFF2-40B4-BE49-F238E27FC236}">
-                <a16:creationId xmlns:a16="http://schemas.microsoft.com/office/drawing/2014/main" id="{165CE0C9-72C2-AA0A-1A63-31814841F93E}"/>
+                <a16:creationId xmlns:a16="http://schemas.microsoft.com/office/drawing/2014/main" id="{1ACAAF44-85D2-8871-D213-0EB4553DF258}"/>
               </a:ext>
             </a:extLst>
           </p:cNvPr>
@@ -9475,8 +9958,8 @@
         </p:blipFill>
         <p:spPr>
           <a:xfrm>
-            <a:off x="3180290" y="3007615"/>
-            <a:ext cx="5691909" cy="3110150"/>
+            <a:off x="3150723" y="3555730"/>
+            <a:ext cx="5236789" cy="2960775"/>
           </a:xfrm>
           <a:prstGeom prst="rect">
             <a:avLst/>
@@ -10774,6 +11257,15 @@
 </p:tagLst>
 </file>
 
+<file path=ppt/tags/tag89.xml><?xml version="1.0" encoding="utf-8"?>
+<p:tagLst xmlns:a="http://schemas.openxmlformats.org/drawingml/2006/main" xmlns:r="http://schemas.openxmlformats.org/officeDocument/2006/relationships" xmlns:p="http://schemas.openxmlformats.org/presentationml/2006/main">
+  <p:tag name="KSO_WM_BEAUTIFY_FLAG" val="#wm#"/>
+  <p:tag name="KSO_WM_TEMPLATE_CATEGORY" val="custom"/>
+  <p:tag name="KSO_WM_TEMPLATE_INDEX" val="20187308"/>
+  <p:tag name="KSO_WM_SPECIAL_SOURCE" val="bdnull"/>
+</p:tagLst>
+</file>
+
 <file path=ppt/tags/tag9.xml><?xml version="1.0" encoding="utf-8"?>
 <p:tagLst xmlns:a="http://schemas.openxmlformats.org/drawingml/2006/main" xmlns:r="http://schemas.openxmlformats.org/officeDocument/2006/relationships" xmlns:p="http://schemas.openxmlformats.org/presentationml/2006/main">
   <p:tag name="KSO_WM_UNIT_HIGHLIGHT" val="0"/>
@@ -10784,6 +11276,33 @@
   <p:tag name="KSO_WM_UNIT_LAYERLEVEL" val="1"/>
   <p:tag name="KSO_WM_TAG_VERSION" val="1.0"/>
   <p:tag name="KSO_WM_BEAUTIFY_FLAG" val="#wm#"/>
+</p:tagLst>
+</file>
+
+<file path=ppt/tags/tag90.xml><?xml version="1.0" encoding="utf-8"?>
+<p:tagLst xmlns:a="http://schemas.openxmlformats.org/drawingml/2006/main" xmlns:r="http://schemas.openxmlformats.org/officeDocument/2006/relationships" xmlns:p="http://schemas.openxmlformats.org/presentationml/2006/main">
+  <p:tag name="KSO_WM_BEAUTIFY_FLAG" val="#wm#"/>
+  <p:tag name="KSO_WM_TEMPLATE_CATEGORY" val="custom"/>
+  <p:tag name="KSO_WM_TEMPLATE_INDEX" val="20187308"/>
+  <p:tag name="KSO_WM_SPECIAL_SOURCE" val="bdnull"/>
+</p:tagLst>
+</file>
+
+<file path=ppt/tags/tag91.xml><?xml version="1.0" encoding="utf-8"?>
+<p:tagLst xmlns:a="http://schemas.openxmlformats.org/drawingml/2006/main" xmlns:r="http://schemas.openxmlformats.org/officeDocument/2006/relationships" xmlns:p="http://schemas.openxmlformats.org/presentationml/2006/main">
+  <p:tag name="KSO_WM_BEAUTIFY_FLAG" val="#wm#"/>
+  <p:tag name="KSO_WM_TEMPLATE_CATEGORY" val="custom"/>
+  <p:tag name="KSO_WM_TEMPLATE_INDEX" val="20187308"/>
+  <p:tag name="KSO_WM_SPECIAL_SOURCE" val="bdnull"/>
+</p:tagLst>
+</file>
+
+<file path=ppt/tags/tag92.xml><?xml version="1.0" encoding="utf-8"?>
+<p:tagLst xmlns:a="http://schemas.openxmlformats.org/drawingml/2006/main" xmlns:r="http://schemas.openxmlformats.org/officeDocument/2006/relationships" xmlns:p="http://schemas.openxmlformats.org/presentationml/2006/main">
+  <p:tag name="KSO_WM_BEAUTIFY_FLAG" val="#wm#"/>
+  <p:tag name="KSO_WM_TEMPLATE_CATEGORY" val="custom"/>
+  <p:tag name="KSO_WM_TEMPLATE_INDEX" val="20187308"/>
+  <p:tag name="KSO_WM_SPECIAL_SOURCE" val="bdnull"/>
 </p:tagLst>
 </file>
 

</xml_diff>